<commit_message>
Some sycnhing so that the backend works
</commit_message>
<xml_diff>
--- a/BackendDemoProject_ForExam.pptx
+++ b/BackendDemoProject_ForExam.pptx
@@ -9720,7 +9720,7 @@
             <a:pPr lvl="1"/>
             <a:r>
               <a:rPr lang="en-US" i="1" dirty="0"/>
-              <a:t>Other options could be role based bundling of the endpoint</a:t>
+              <a:t>Other options could be role based bundling of the endpoints</a:t>
             </a:r>
           </a:p>
           <a:p>
@@ -9788,7 +9788,15 @@
             <a:pPr lvl="1"/>
             <a:r>
               <a:rPr lang="en-US" i="1" dirty="0"/>
-              <a:t>Why aren’t all endpoints in this project with the new model? That would take time, the five already demonstrate the new model well</a:t>
+              <a:t>Why aren’t all endpoints in this project with the new model? That would take time</a:t>
+            </a:r>
+            <a:r>
+              <a:rPr lang="en-US" i="1"/>
+              <a:t>, and the </a:t>
+            </a:r>
+            <a:r>
+              <a:rPr lang="en-US" i="1" dirty="0"/>
+              <a:t>five already demonstrate the new model well</a:t>
             </a:r>
           </a:p>
           <a:p>
@@ -10453,24 +10461,6 @@
 </file>
 
 <file path=customXml/item1.xml><?xml version="1.0" encoding="utf-8"?>
-<?mso-contentType ?>
-<FormTemplates xmlns="http://schemas.microsoft.com/sharepoint/v3/contenttype/forms">
-  <Display>DocumentLibraryForm</Display>
-  <Edit>DocumentLibraryForm</Edit>
-  <New>DocumentLibraryForm</New>
-</FormTemplates>
-</file>
-
-<file path=customXml/item2.xml><?xml version="1.0" encoding="utf-8"?>
-<p:properties xmlns:p="http://schemas.microsoft.com/office/2006/metadata/properties" xmlns:xsi="http://www.w3.org/2001/XMLSchema-instance" xmlns:pc="http://schemas.microsoft.com/office/infopath/2007/PartnerControls">
-  <documentManagement>
-    <PublishingExpirationDate xmlns="http://schemas.microsoft.com/sharepoint/v3" xsi:nil="true"/>
-    <PublishingStartDate xmlns="http://schemas.microsoft.com/sharepoint/v3" xsi:nil="true"/>
-  </documentManagement>
-</p:properties>
-</file>
-
-<file path=customXml/item3.xml><?xml version="1.0" encoding="utf-8"?>
 <ct:contentTypeSchema xmlns:ct="http://schemas.microsoft.com/office/2006/metadata/contentType" xmlns:ma="http://schemas.microsoft.com/office/2006/metadata/properties/metaAttributes" ct:_="" ma:_="" ma:contentTypeName="Document" ma:contentTypeID="0x01010024C55B41993A414DABB8DD07ACBA0814" ma:contentTypeVersion="1" ma:contentTypeDescription="Create a new document." ma:contentTypeScope="" ma:versionID="3ea0c22b5866975a7b271665de4056c5">
   <xsd:schema xmlns:xsd="http://www.w3.org/2001/XMLSchema" xmlns:xs="http://www.w3.org/2001/XMLSchema" xmlns:p="http://schemas.microsoft.com/office/2006/metadata/properties" xmlns:ns1="http://schemas.microsoft.com/sharepoint/v3" targetNamespace="http://schemas.microsoft.com/office/2006/metadata/properties" ma:root="true" ma:fieldsID="ef2aa9ed40e72a78c3822fc753b43e87" ns1:_="">
     <xsd:import namespace="http://schemas.microsoft.com/sharepoint/v3"/>
@@ -10602,10 +10592,38 @@
 </ct:contentTypeSchema>
 </file>
 
+<file path=customXml/item2.xml><?xml version="1.0" encoding="utf-8"?>
+<p:properties xmlns:p="http://schemas.microsoft.com/office/2006/metadata/properties" xmlns:xsi="http://www.w3.org/2001/XMLSchema-instance" xmlns:pc="http://schemas.microsoft.com/office/infopath/2007/PartnerControls">
+  <documentManagement>
+    <PublishingExpirationDate xmlns="http://schemas.microsoft.com/sharepoint/v3" xsi:nil="true"/>
+    <PublishingStartDate xmlns="http://schemas.microsoft.com/sharepoint/v3" xsi:nil="true"/>
+  </documentManagement>
+</p:properties>
+</file>
+
+<file path=customXml/item3.xml><?xml version="1.0" encoding="utf-8"?>
+<?mso-contentType ?>
+<FormTemplates xmlns="http://schemas.microsoft.com/sharepoint/v3/contenttype/forms">
+  <Display>DocumentLibraryForm</Display>
+  <Edit>DocumentLibraryForm</Edit>
+  <New>DocumentLibraryForm</New>
+</FormTemplates>
+</file>
+
 <file path=customXml/itemProps1.xml><?xml version="1.0" encoding="utf-8"?>
-<ds:datastoreItem xmlns:ds="http://schemas.openxmlformats.org/officeDocument/2006/customXml" ds:itemID="{D546C03B-CD3A-4EA0-AAA4-0E00E896454E}">
+<ds:datastoreItem xmlns:ds="http://schemas.openxmlformats.org/officeDocument/2006/customXml" ds:itemID="{B9E4DC25-62AA-44A0-8D5C-DB44892588AF}">
   <ds:schemaRefs>
-    <ds:schemaRef ds:uri="http://schemas.microsoft.com/sharepoint/v3/contenttype/forms"/>
+    <ds:schemaRef ds:uri="http://schemas.microsoft.com/office/2006/metadata/contentType"/>
+    <ds:schemaRef ds:uri="http://schemas.microsoft.com/office/2006/metadata/properties/metaAttributes"/>
+    <ds:schemaRef ds:uri="http://www.w3.org/2001/XMLSchema"/>
+    <ds:schemaRef ds:uri="http://schemas.microsoft.com/office/2006/metadata/properties"/>
+    <ds:schemaRef ds:uri="http://schemas.microsoft.com/sharepoint/v3"/>
+    <ds:schemaRef ds:uri="http://schemas.microsoft.com/office/2006/documentManagement/types"/>
+    <ds:schemaRef ds:uri="http://schemas.microsoft.com/office/infopath/2007/PartnerControls"/>
+    <ds:schemaRef ds:uri="http://schemas.openxmlformats.org/package/2006/metadata/core-properties"/>
+    <ds:schemaRef ds:uri="http://purl.org/dc/elements/1.1/"/>
+    <ds:schemaRef ds:uri="http://purl.org/dc/terms/"/>
+    <ds:schemaRef ds:uri="http://schemas.microsoft.com/internal/obd"/>
   </ds:schemaRefs>
 </ds:datastoreItem>
 </file>
@@ -10627,19 +10645,9 @@
 </file>
 
 <file path=customXml/itemProps3.xml><?xml version="1.0" encoding="utf-8"?>
-<ds:datastoreItem xmlns:ds="http://schemas.openxmlformats.org/officeDocument/2006/customXml" ds:itemID="{B9E4DC25-62AA-44A0-8D5C-DB44892588AF}">
+<ds:datastoreItem xmlns:ds="http://schemas.openxmlformats.org/officeDocument/2006/customXml" ds:itemID="{D546C03B-CD3A-4EA0-AAA4-0E00E896454E}">
   <ds:schemaRefs>
-    <ds:schemaRef ds:uri="http://schemas.microsoft.com/office/2006/metadata/contentType"/>
-    <ds:schemaRef ds:uri="http://schemas.microsoft.com/office/2006/metadata/properties/metaAttributes"/>
-    <ds:schemaRef ds:uri="http://www.w3.org/2001/XMLSchema"/>
-    <ds:schemaRef ds:uri="http://schemas.microsoft.com/office/2006/metadata/properties"/>
-    <ds:schemaRef ds:uri="http://schemas.microsoft.com/sharepoint/v3"/>
-    <ds:schemaRef ds:uri="http://schemas.microsoft.com/office/2006/documentManagement/types"/>
-    <ds:schemaRef ds:uri="http://schemas.microsoft.com/office/infopath/2007/PartnerControls"/>
-    <ds:schemaRef ds:uri="http://schemas.openxmlformats.org/package/2006/metadata/core-properties"/>
-    <ds:schemaRef ds:uri="http://purl.org/dc/elements/1.1/"/>
-    <ds:schemaRef ds:uri="http://purl.org/dc/terms/"/>
-    <ds:schemaRef ds:uri="http://schemas.microsoft.com/internal/obd"/>
+    <ds:schemaRef ds:uri="http://schemas.microsoft.com/sharepoint/v3/contenttype/forms"/>
   </ds:schemaRefs>
 </ds:datastoreItem>
 </file>
</xml_diff>